<commit_message>
fix: cor dos gráficos
</commit_message>
<xml_diff>
--- a/templates/modelo.pptx
+++ b/templates/modelo.pptx
@@ -335,7 +335,7 @@
             <a:fld id="{1D8BD707-D9CF-40AE-B4C6-C98DA3205C09}" type="datetimeFigureOut">
               <a:rPr lang="en-US" smtClean="0"/>
               <a:pPr/>
-              <a:t>6/11/25</a:t>
+              <a:t>6/12/25</a:t>
             </a:fld>
             <a:endParaRPr lang="en-US"/>
           </a:p>
@@ -500,7 +500,7 @@
             <a:fld id="{1D8BD707-D9CF-40AE-B4C6-C98DA3205C09}" type="datetimeFigureOut">
               <a:rPr lang="en-US" smtClean="0"/>
               <a:pPr/>
-              <a:t>6/11/25</a:t>
+              <a:t>6/12/25</a:t>
             </a:fld>
             <a:endParaRPr lang="en-US"/>
           </a:p>
@@ -675,7 +675,7 @@
             <a:fld id="{1D8BD707-D9CF-40AE-B4C6-C98DA3205C09}" type="datetimeFigureOut">
               <a:rPr lang="en-US" smtClean="0"/>
               <a:pPr/>
-              <a:t>6/11/25</a:t>
+              <a:t>6/12/25</a:t>
             </a:fld>
             <a:endParaRPr lang="en-US"/>
           </a:p>
@@ -840,7 +840,7 @@
             <a:fld id="{1D8BD707-D9CF-40AE-B4C6-C98DA3205C09}" type="datetimeFigureOut">
               <a:rPr lang="en-US" smtClean="0"/>
               <a:pPr/>
-              <a:t>6/11/25</a:t>
+              <a:t>6/12/25</a:t>
             </a:fld>
             <a:endParaRPr lang="en-US"/>
           </a:p>
@@ -1082,7 +1082,7 @@
             <a:fld id="{1D8BD707-D9CF-40AE-B4C6-C98DA3205C09}" type="datetimeFigureOut">
               <a:rPr lang="en-US" smtClean="0"/>
               <a:pPr/>
-              <a:t>6/11/25</a:t>
+              <a:t>6/12/25</a:t>
             </a:fld>
             <a:endParaRPr lang="en-US"/>
           </a:p>
@@ -1364,7 +1364,7 @@
             <a:fld id="{1D8BD707-D9CF-40AE-B4C6-C98DA3205C09}" type="datetimeFigureOut">
               <a:rPr lang="en-US" smtClean="0"/>
               <a:pPr/>
-              <a:t>6/11/25</a:t>
+              <a:t>6/12/25</a:t>
             </a:fld>
             <a:endParaRPr lang="en-US"/>
           </a:p>
@@ -1780,7 +1780,7 @@
             <a:fld id="{1D8BD707-D9CF-40AE-B4C6-C98DA3205C09}" type="datetimeFigureOut">
               <a:rPr lang="en-US" smtClean="0"/>
               <a:pPr/>
-              <a:t>6/11/25</a:t>
+              <a:t>6/12/25</a:t>
             </a:fld>
             <a:endParaRPr lang="en-US"/>
           </a:p>
@@ -1894,7 +1894,7 @@
             <a:fld id="{1D8BD707-D9CF-40AE-B4C6-C98DA3205C09}" type="datetimeFigureOut">
               <a:rPr lang="en-US" smtClean="0"/>
               <a:pPr/>
-              <a:t>6/11/25</a:t>
+              <a:t>6/12/25</a:t>
             </a:fld>
             <a:endParaRPr lang="en-US"/>
           </a:p>
@@ -1986,7 +1986,7 @@
             <a:fld id="{1D8BD707-D9CF-40AE-B4C6-C98DA3205C09}" type="datetimeFigureOut">
               <a:rPr lang="en-US" smtClean="0"/>
               <a:pPr/>
-              <a:t>6/11/25</a:t>
+              <a:t>6/12/25</a:t>
             </a:fld>
             <a:endParaRPr lang="en-US"/>
           </a:p>
@@ -2258,7 +2258,7 @@
             <a:fld id="{1D8BD707-D9CF-40AE-B4C6-C98DA3205C09}" type="datetimeFigureOut">
               <a:rPr lang="en-US" smtClean="0"/>
               <a:pPr/>
-              <a:t>6/11/25</a:t>
+              <a:t>6/12/25</a:t>
             </a:fld>
             <a:endParaRPr lang="en-US"/>
           </a:p>
@@ -2507,7 +2507,7 @@
             <a:fld id="{1D8BD707-D9CF-40AE-B4C6-C98DA3205C09}" type="datetimeFigureOut">
               <a:rPr lang="en-US" smtClean="0"/>
               <a:pPr/>
-              <a:t>6/11/25</a:t>
+              <a:t>6/12/25</a:t>
             </a:fld>
             <a:endParaRPr lang="en-US"/>
           </a:p>
@@ -2715,7 +2715,7 @@
             <a:fld id="{1D8BD707-D9CF-40AE-B4C6-C98DA3205C09}" type="datetimeFigureOut">
               <a:rPr lang="en-US" smtClean="0"/>
               <a:pPr/>
-              <a:t>6/11/25</a:t>
+              <a:t>6/12/25</a:t>
             </a:fld>
             <a:endParaRPr lang="en-US"/>
           </a:p>
@@ -3302,15 +3302,15 @@
         </p:nvSpPr>
         <p:spPr>
           <a:xfrm>
-            <a:off x="5769397" y="8696960"/>
-            <a:ext cx="3374603" cy="395621"/>
+            <a:off x="5029200" y="8696960"/>
+            <a:ext cx="4800600" cy="395621"/>
           </a:xfrm>
           <a:prstGeom prst="rect">
             <a:avLst/>
           </a:prstGeom>
         </p:spPr>
         <p:txBody>
-          <a:bodyPr lIns="0" tIns="0" rIns="0" bIns="0" rtlCol="0" anchor="t">
+          <a:bodyPr wrap="square" lIns="0" tIns="0" rIns="0" bIns="0" rtlCol="0" anchor="t">
             <a:spAutoFit/>
           </a:bodyPr>
           <a:lstStyle/>
@@ -3384,15 +3384,15 @@
         </p:nvSpPr>
         <p:spPr>
           <a:xfrm>
-            <a:off x="5769397" y="9220200"/>
-            <a:ext cx="3374603" cy="314607"/>
+            <a:off x="5029200" y="9220200"/>
+            <a:ext cx="4800600" cy="314607"/>
           </a:xfrm>
           <a:prstGeom prst="rect">
             <a:avLst/>
           </a:prstGeom>
         </p:spPr>
         <p:txBody>
-          <a:bodyPr lIns="0" tIns="0" rIns="0" bIns="0" rtlCol="0" anchor="t">
+          <a:bodyPr wrap="square" lIns="0" tIns="0" rIns="0" bIns="0" rtlCol="0" anchor="t">
             <a:spAutoFit/>
           </a:bodyPr>
           <a:lstStyle/>

</xml_diff>

<commit_message>
fix: alteração de variáveis
</commit_message>
<xml_diff>
--- a/templates/modelo.pptx
+++ b/templates/modelo.pptx
@@ -335,7 +335,7 @@
             <a:fld id="{1D8BD707-D9CF-40AE-B4C6-C98DA3205C09}" type="datetimeFigureOut">
               <a:rPr lang="en-US" smtClean="0"/>
               <a:pPr/>
-              <a:t>6/12/25</a:t>
+              <a:t>6/14/25</a:t>
             </a:fld>
             <a:endParaRPr lang="en-US"/>
           </a:p>
@@ -500,7 +500,7 @@
             <a:fld id="{1D8BD707-D9CF-40AE-B4C6-C98DA3205C09}" type="datetimeFigureOut">
               <a:rPr lang="en-US" smtClean="0"/>
               <a:pPr/>
-              <a:t>6/12/25</a:t>
+              <a:t>6/14/25</a:t>
             </a:fld>
             <a:endParaRPr lang="en-US"/>
           </a:p>
@@ -675,7 +675,7 @@
             <a:fld id="{1D8BD707-D9CF-40AE-B4C6-C98DA3205C09}" type="datetimeFigureOut">
               <a:rPr lang="en-US" smtClean="0"/>
               <a:pPr/>
-              <a:t>6/12/25</a:t>
+              <a:t>6/14/25</a:t>
             </a:fld>
             <a:endParaRPr lang="en-US"/>
           </a:p>
@@ -840,7 +840,7 @@
             <a:fld id="{1D8BD707-D9CF-40AE-B4C6-C98DA3205C09}" type="datetimeFigureOut">
               <a:rPr lang="en-US" smtClean="0"/>
               <a:pPr/>
-              <a:t>6/12/25</a:t>
+              <a:t>6/14/25</a:t>
             </a:fld>
             <a:endParaRPr lang="en-US"/>
           </a:p>
@@ -1082,7 +1082,7 @@
             <a:fld id="{1D8BD707-D9CF-40AE-B4C6-C98DA3205C09}" type="datetimeFigureOut">
               <a:rPr lang="en-US" smtClean="0"/>
               <a:pPr/>
-              <a:t>6/12/25</a:t>
+              <a:t>6/14/25</a:t>
             </a:fld>
             <a:endParaRPr lang="en-US"/>
           </a:p>
@@ -1364,7 +1364,7 @@
             <a:fld id="{1D8BD707-D9CF-40AE-B4C6-C98DA3205C09}" type="datetimeFigureOut">
               <a:rPr lang="en-US" smtClean="0"/>
               <a:pPr/>
-              <a:t>6/12/25</a:t>
+              <a:t>6/14/25</a:t>
             </a:fld>
             <a:endParaRPr lang="en-US"/>
           </a:p>
@@ -1780,7 +1780,7 @@
             <a:fld id="{1D8BD707-D9CF-40AE-B4C6-C98DA3205C09}" type="datetimeFigureOut">
               <a:rPr lang="en-US" smtClean="0"/>
               <a:pPr/>
-              <a:t>6/12/25</a:t>
+              <a:t>6/14/25</a:t>
             </a:fld>
             <a:endParaRPr lang="en-US"/>
           </a:p>
@@ -1894,7 +1894,7 @@
             <a:fld id="{1D8BD707-D9CF-40AE-B4C6-C98DA3205C09}" type="datetimeFigureOut">
               <a:rPr lang="en-US" smtClean="0"/>
               <a:pPr/>
-              <a:t>6/12/25</a:t>
+              <a:t>6/14/25</a:t>
             </a:fld>
             <a:endParaRPr lang="en-US"/>
           </a:p>
@@ -1986,7 +1986,7 @@
             <a:fld id="{1D8BD707-D9CF-40AE-B4C6-C98DA3205C09}" type="datetimeFigureOut">
               <a:rPr lang="en-US" smtClean="0"/>
               <a:pPr/>
-              <a:t>6/12/25</a:t>
+              <a:t>6/14/25</a:t>
             </a:fld>
             <a:endParaRPr lang="en-US"/>
           </a:p>
@@ -2258,7 +2258,7 @@
             <a:fld id="{1D8BD707-D9CF-40AE-B4C6-C98DA3205C09}" type="datetimeFigureOut">
               <a:rPr lang="en-US" smtClean="0"/>
               <a:pPr/>
-              <a:t>6/12/25</a:t>
+              <a:t>6/14/25</a:t>
             </a:fld>
             <a:endParaRPr lang="en-US"/>
           </a:p>
@@ -2507,7 +2507,7 @@
             <a:fld id="{1D8BD707-D9CF-40AE-B4C6-C98DA3205C09}" type="datetimeFigureOut">
               <a:rPr lang="en-US" smtClean="0"/>
               <a:pPr/>
-              <a:t>6/12/25</a:t>
+              <a:t>6/14/25</a:t>
             </a:fld>
             <a:endParaRPr lang="en-US"/>
           </a:p>
@@ -2715,7 +2715,7 @@
             <a:fld id="{1D8BD707-D9CF-40AE-B4C6-C98DA3205C09}" type="datetimeFigureOut">
               <a:rPr lang="en-US" smtClean="0"/>
               <a:pPr/>
-              <a:t>6/12/25</a:t>
+              <a:t>6/14/25</a:t>
             </a:fld>
             <a:endParaRPr lang="en-US"/>
           </a:p>
@@ -7073,7 +7073,7 @@
               </a:lnSpc>
             </a:pPr>
             <a:r>
-              <a:rPr lang="en-US" sz="1800">
+              <a:rPr lang="en-US" sz="1800" dirty="0">
                 <a:solidFill>
                   <a:srgbClr val="134E4A"/>
                 </a:solidFill>
@@ -8069,14 +8069,14 @@
       </p:sp>
       <p:sp>
         <p:nvSpPr>
-          <p:cNvPr id="6" name="TextBox 6"/>
+          <p:cNvPr id="7" name="TextBox 7"/>
           <p:cNvSpPr txBox="1"/>
           <p:nvPr/>
         </p:nvSpPr>
         <p:spPr>
           <a:xfrm>
-            <a:off x="1133326" y="3177389"/>
-            <a:ext cx="5229796" cy="325755"/>
+            <a:off x="2759351" y="985788"/>
+            <a:ext cx="3619633" cy="291211"/>
           </a:xfrm>
           <a:prstGeom prst="rect">
             <a:avLst/>
@@ -8090,11 +8090,14 @@
           <a:p>
             <a:pPr algn="l">
               <a:lnSpc>
-                <a:spcPts val="2520"/>
-              </a:lnSpc>
-            </a:pPr>
-            <a:r>
-              <a:rPr lang="en-US" sz="1800">
+                <a:spcPts val="2323"/>
+              </a:lnSpc>
+              <a:spcBef>
+                <a:spcPct val="0"/>
+              </a:spcBef>
+            </a:pPr>
+            <a:r>
+              <a:rPr lang="en-US" sz="1659">
                 <a:solidFill>
                   <a:srgbClr val="134E4A"/>
                 </a:solidFill>
@@ -8103,21 +8106,27 @@
                 <a:cs typeface="Poppins"/>
                 <a:sym typeface="Poppins"/>
               </a:rPr>
-              <a:t>{{por_que_aumenta}}</a:t>
-            </a:r>
-          </a:p>
-        </p:txBody>
-      </p:sp>
-      <p:sp>
-        <p:nvSpPr>
-          <p:cNvPr id="7" name="TextBox 7"/>
+              <a:t>{{CLIENTE}}</a:t>
+            </a:r>
+          </a:p>
+        </p:txBody>
+      </p:sp>
+      <p:sp>
+        <p:nvSpPr>
+          <p:cNvPr id="8" name="TextBox 5">
+            <a:extLst>
+              <a:ext uri="{FF2B5EF4-FFF2-40B4-BE49-F238E27FC236}">
+                <a16:creationId xmlns:a16="http://schemas.microsoft.com/office/drawing/2014/main" id="{380DB61F-24E5-56B9-5662-661B7BBDED30}"/>
+              </a:ext>
+            </a:extLst>
+          </p:cNvPr>
           <p:cNvSpPr txBox="1"/>
           <p:nvPr/>
         </p:nvSpPr>
         <p:spPr>
           <a:xfrm>
-            <a:off x="2759351" y="985788"/>
-            <a:ext cx="3619633" cy="291211"/>
+            <a:off x="1028700" y="3177389"/>
+            <a:ext cx="5290377" cy="309700"/>
           </a:xfrm>
           <a:prstGeom prst="rect">
             <a:avLst/>
@@ -8131,14 +8140,11 @@
           <a:p>
             <a:pPr algn="l">
               <a:lnSpc>
-                <a:spcPts val="2323"/>
-              </a:lnSpc>
-              <a:spcBef>
-                <a:spcPct val="0"/>
-              </a:spcBef>
-            </a:pPr>
-            <a:r>
-              <a:rPr lang="en-US" sz="1659">
+                <a:spcPts val="2520"/>
+              </a:lnSpc>
+            </a:pPr>
+            <a:r>
+              <a:rPr lang="en-US" sz="1800" dirty="0">
                 <a:solidFill>
                   <a:srgbClr val="134E4A"/>
                 </a:solidFill>
@@ -8147,7 +8153,7 @@
                 <a:cs typeface="Poppins"/>
                 <a:sym typeface="Poppins"/>
               </a:rPr>
-              <a:t>{{CLIENTE}}</a:t>
+              <a:t>{{por_que_aumenta}}</a:t>
             </a:r>
           </a:p>
         </p:txBody>
@@ -8493,50 +8499,6 @@
       </p:sp>
       <p:sp>
         <p:nvSpPr>
-          <p:cNvPr id="9" name="TextBox 9"/>
-          <p:cNvSpPr txBox="1"/>
-          <p:nvPr/>
-        </p:nvSpPr>
-        <p:spPr>
-          <a:xfrm>
-            <a:off x="1028700" y="3027031"/>
-            <a:ext cx="5421561" cy="325755"/>
-          </a:xfrm>
-          <a:prstGeom prst="rect">
-            <a:avLst/>
-          </a:prstGeom>
-        </p:spPr>
-        <p:txBody>
-          <a:bodyPr lIns="0" tIns="0" rIns="0" bIns="0" rtlCol="0" anchor="t">
-            <a:spAutoFit/>
-          </a:bodyPr>
-          <a:lstStyle/>
-          <a:p>
-            <a:pPr algn="l">
-              <a:lnSpc>
-                <a:spcPts val="2520"/>
-              </a:lnSpc>
-              <a:spcBef>
-                <a:spcPct val="0"/>
-              </a:spcBef>
-            </a:pPr>
-            <a:r>
-              <a:rPr lang="en-US" sz="1800">
-                <a:solidFill>
-                  <a:srgbClr val="134E4A"/>
-                </a:solidFill>
-                <a:latin typeface="Poppins"/>
-                <a:ea typeface="Poppins"/>
-                <a:cs typeface="Poppins"/>
-                <a:sym typeface="Poppins"/>
-              </a:rPr>
-              <a:t>{{producao_mensal}}</a:t>
-            </a:r>
-          </a:p>
-        </p:txBody>
-      </p:sp>
-      <p:sp>
-        <p:nvSpPr>
           <p:cNvPr id="10" name="TextBox 10"/>
           <p:cNvSpPr txBox="1"/>
           <p:nvPr/>
@@ -8622,6 +8584,53 @@
                 <a:sym typeface="Poppins"/>
               </a:rPr>
               <a:t>04</a:t>
+            </a:r>
+          </a:p>
+        </p:txBody>
+      </p:sp>
+      <p:sp>
+        <p:nvSpPr>
+          <p:cNvPr id="6" name="TextBox 5">
+            <a:extLst>
+              <a:ext uri="{FF2B5EF4-FFF2-40B4-BE49-F238E27FC236}">
+                <a16:creationId xmlns:a16="http://schemas.microsoft.com/office/drawing/2014/main" id="{65513F23-DBDC-E0B5-8711-566C7A881942}"/>
+              </a:ext>
+            </a:extLst>
+          </p:cNvPr>
+          <p:cNvSpPr txBox="1"/>
+          <p:nvPr/>
+        </p:nvSpPr>
+        <p:spPr>
+          <a:xfrm>
+            <a:off x="1028700" y="3177389"/>
+            <a:ext cx="5290377" cy="309700"/>
+          </a:xfrm>
+          <a:prstGeom prst="rect">
+            <a:avLst/>
+          </a:prstGeom>
+        </p:spPr>
+        <p:txBody>
+          <a:bodyPr lIns="0" tIns="0" rIns="0" bIns="0" rtlCol="0" anchor="t">
+            <a:spAutoFit/>
+          </a:bodyPr>
+          <a:lstStyle/>
+          <a:p>
+            <a:pPr algn="l">
+              <a:lnSpc>
+                <a:spcPts val="2520"/>
+              </a:lnSpc>
+            </a:pPr>
+            <a:r>
+              <a:rPr lang="en-US" sz="1800" dirty="0">
+                <a:solidFill>
+                  <a:srgbClr val="134E4A"/>
+                </a:solidFill>
+                <a:latin typeface="Poppins"/>
+                <a:ea typeface="Poppins"/>
+                <a:cs typeface="Poppins"/>
+                <a:sym typeface="Poppins"/>
+              </a:rPr>
+              <a:t>{{com_energia_solar}}</a:t>
             </a:r>
           </a:p>
         </p:txBody>

</xml_diff>